<commit_message>
Changes made at home. Final plots uploaded.
</commit_message>
<xml_diff>
--- a/figs/PresentationPlots_Stiling.pptx
+++ b/figs/PresentationPlots_Stiling.pptx
@@ -2,7 +2,7 @@
 <file path=ppt/presentation.xml><?xml version="1.0" encoding="utf-8"?>
 <p:presentation xmlns:a="http://schemas.openxmlformats.org/drawingml/2006/main" xmlns:r="http://schemas.openxmlformats.org/officeDocument/2006/relationships" xmlns:p="http://schemas.openxmlformats.org/presentationml/2006/main" saveSubsetFonts="1">
   <p:sldMasterIdLst>
-    <p:sldMasterId id="2147483660" r:id="rId1"/>
+    <p:sldMasterId id="2147483672" r:id="rId1"/>
   </p:sldMasterIdLst>
   <p:notesMasterIdLst>
     <p:notesMasterId r:id="rId4"/>
@@ -17,7 +17,7 @@
     <a:defPPr>
       <a:defRPr lang="en-US"/>
     </a:defPPr>
-    <a:lvl1pPr marL="0" algn="l" defTabSz="914400" rtl="0" eaLnBrk="1" latinLnBrk="0" hangingPunct="1">
+    <a:lvl1pPr marL="0" algn="l" defTabSz="457200" rtl="0" eaLnBrk="1" latinLnBrk="0" hangingPunct="1">
       <a:defRPr sz="1800" kern="1200">
         <a:solidFill>
           <a:schemeClr val="tx1"/>
@@ -27,7 +27,7 @@
         <a:cs typeface="+mn-cs"/>
       </a:defRPr>
     </a:lvl1pPr>
-    <a:lvl2pPr marL="457200" algn="l" defTabSz="914400" rtl="0" eaLnBrk="1" latinLnBrk="0" hangingPunct="1">
+    <a:lvl2pPr marL="457200" algn="l" defTabSz="457200" rtl="0" eaLnBrk="1" latinLnBrk="0" hangingPunct="1">
       <a:defRPr sz="1800" kern="1200">
         <a:solidFill>
           <a:schemeClr val="tx1"/>
@@ -37,7 +37,7 @@
         <a:cs typeface="+mn-cs"/>
       </a:defRPr>
     </a:lvl2pPr>
-    <a:lvl3pPr marL="914400" algn="l" defTabSz="914400" rtl="0" eaLnBrk="1" latinLnBrk="0" hangingPunct="1">
+    <a:lvl3pPr marL="914400" algn="l" defTabSz="457200" rtl="0" eaLnBrk="1" latinLnBrk="0" hangingPunct="1">
       <a:defRPr sz="1800" kern="1200">
         <a:solidFill>
           <a:schemeClr val="tx1"/>
@@ -47,7 +47,7 @@
         <a:cs typeface="+mn-cs"/>
       </a:defRPr>
     </a:lvl3pPr>
-    <a:lvl4pPr marL="1371600" algn="l" defTabSz="914400" rtl="0" eaLnBrk="1" latinLnBrk="0" hangingPunct="1">
+    <a:lvl4pPr marL="1371600" algn="l" defTabSz="457200" rtl="0" eaLnBrk="1" latinLnBrk="0" hangingPunct="1">
       <a:defRPr sz="1800" kern="1200">
         <a:solidFill>
           <a:schemeClr val="tx1"/>
@@ -57,7 +57,7 @@
         <a:cs typeface="+mn-cs"/>
       </a:defRPr>
     </a:lvl4pPr>
-    <a:lvl5pPr marL="1828800" algn="l" defTabSz="914400" rtl="0" eaLnBrk="1" latinLnBrk="0" hangingPunct="1">
+    <a:lvl5pPr marL="1828800" algn="l" defTabSz="457200" rtl="0" eaLnBrk="1" latinLnBrk="0" hangingPunct="1">
       <a:defRPr sz="1800" kern="1200">
         <a:solidFill>
           <a:schemeClr val="tx1"/>
@@ -67,7 +67,7 @@
         <a:cs typeface="+mn-cs"/>
       </a:defRPr>
     </a:lvl5pPr>
-    <a:lvl6pPr marL="2286000" algn="l" defTabSz="914400" rtl="0" eaLnBrk="1" latinLnBrk="0" hangingPunct="1">
+    <a:lvl6pPr marL="2286000" algn="l" defTabSz="457200" rtl="0" eaLnBrk="1" latinLnBrk="0" hangingPunct="1">
       <a:defRPr sz="1800" kern="1200">
         <a:solidFill>
           <a:schemeClr val="tx1"/>
@@ -77,7 +77,7 @@
         <a:cs typeface="+mn-cs"/>
       </a:defRPr>
     </a:lvl6pPr>
-    <a:lvl7pPr marL="2743200" algn="l" defTabSz="914400" rtl="0" eaLnBrk="1" latinLnBrk="0" hangingPunct="1">
+    <a:lvl7pPr marL="2743200" algn="l" defTabSz="457200" rtl="0" eaLnBrk="1" latinLnBrk="0" hangingPunct="1">
       <a:defRPr sz="1800" kern="1200">
         <a:solidFill>
           <a:schemeClr val="tx1"/>
@@ -87,7 +87,7 @@
         <a:cs typeface="+mn-cs"/>
       </a:defRPr>
     </a:lvl7pPr>
-    <a:lvl8pPr marL="3200400" algn="l" defTabSz="914400" rtl="0" eaLnBrk="1" latinLnBrk="0" hangingPunct="1">
+    <a:lvl8pPr marL="3200400" algn="l" defTabSz="457200" rtl="0" eaLnBrk="1" latinLnBrk="0" hangingPunct="1">
       <a:defRPr sz="1800" kern="1200">
         <a:solidFill>
           <a:schemeClr val="tx1"/>
@@ -97,7 +97,7 @@
         <a:cs typeface="+mn-cs"/>
       </a:defRPr>
     </a:lvl8pPr>
-    <a:lvl9pPr marL="3657600" algn="l" defTabSz="914400" rtl="0" eaLnBrk="1" latinLnBrk="0" hangingPunct="1">
+    <a:lvl9pPr marL="3657600" algn="l" defTabSz="457200" rtl="0" eaLnBrk="1" latinLnBrk="0" hangingPunct="1">
       <a:defRPr sz="1800" kern="1200">
         <a:solidFill>
           <a:schemeClr val="tx1"/>
@@ -209,7 +209,7 @@
           <a:p>
             <a:fld id="{DED7C190-A8EF-48C9-A9A6-D60D393F7734}" type="datetimeFigureOut">
               <a:rPr lang="en-US" smtClean="0"/>
-              <a:t>3/13/2020</a:t>
+              <a:t>3/13/20</a:t>
             </a:fld>
             <a:endParaRPr lang="en-US"/>
           </a:p>
@@ -273,38 +273,37 @@
           <a:p>
             <a:pPr lvl="0"/>
             <a:r>
-              <a:rPr lang="en-US" smtClean="0"/>
+              <a:rPr lang="en-US"/>
               <a:t>Edit Master text styles</a:t>
             </a:r>
           </a:p>
           <a:p>
             <a:pPr lvl="1"/>
             <a:r>
-              <a:rPr lang="en-US" smtClean="0"/>
+              <a:rPr lang="en-US"/>
               <a:t>Second level</a:t>
             </a:r>
           </a:p>
           <a:p>
             <a:pPr lvl="2"/>
             <a:r>
-              <a:rPr lang="en-US" smtClean="0"/>
+              <a:rPr lang="en-US"/>
               <a:t>Third level</a:t>
             </a:r>
           </a:p>
           <a:p>
             <a:pPr lvl="3"/>
             <a:r>
-              <a:rPr lang="en-US" smtClean="0"/>
+              <a:rPr lang="en-US"/>
               <a:t>Fourth level</a:t>
             </a:r>
           </a:p>
           <a:p>
             <a:pPr lvl="4"/>
             <a:r>
-              <a:rPr lang="en-US" smtClean="0"/>
+              <a:rPr lang="en-US"/>
               <a:t>Fifth level</a:t>
             </a:r>
-            <a:endParaRPr lang="en-US"/>
           </a:p>
         </p:txBody>
       </p:sp>
@@ -522,11 +521,11 @@
           <a:lstStyle/>
           <a:p>
             <a:r>
-              <a:rPr lang="en-US" dirty="0" smtClean="0"/>
+              <a:rPr lang="en-US" dirty="0"/>
               <a:t>Graphical</a:t>
             </a:r>
             <a:r>
-              <a:rPr lang="en-US" baseline="0" dirty="0" smtClean="0"/>
+              <a:rPr lang="en-US" baseline="0" dirty="0"/>
               <a:t> techniques that I learned:</a:t>
             </a:r>
           </a:p>
@@ -535,15 +534,15 @@
               <a:buAutoNum type="arabicParenR"/>
             </a:pPr>
             <a:r>
-              <a:rPr lang="en-US" baseline="0" dirty="0" smtClean="0"/>
+              <a:rPr lang="en-US" baseline="0" dirty="0"/>
               <a:t>Plot A. I didn’t like that the default plotted points for the values of zero, so for my size call for the points I used ‘size = </a:t>
             </a:r>
             <a:r>
-              <a:rPr lang="en-US" baseline="0" dirty="0" err="1" smtClean="0"/>
+              <a:rPr lang="en-US" baseline="0" dirty="0" err="1"/>
               <a:t>ifelse</a:t>
             </a:r>
             <a:r>
-              <a:rPr lang="en-US" baseline="0" dirty="0" smtClean="0"/>
+              <a:rPr lang="en-US" baseline="0" dirty="0"/>
               <a:t>(coverage==0, NA, coverage))’ so points are only plotted when the microalgae species was actually in the quadrat sample. Here, zeros in the data plot nothing. </a:t>
             </a:r>
           </a:p>
@@ -566,8 +565,8 @@
               <a:defRPr/>
             </a:pPr>
             <a:r>
-              <a:rPr lang="en-US" baseline="0" dirty="0" smtClean="0"/>
-              <a:t>Plot A. Adding the background shaded rectangles in traditional colors of a pH scale. </a:t>
+              <a:rPr lang="en-US" baseline="0" dirty="0"/>
+              <a:t>Plot A. Adding the background shaded rectangles. </a:t>
             </a:r>
           </a:p>
           <a:p>
@@ -576,71 +575,71 @@
               <a:buChar char="-"/>
             </a:pPr>
             <a:r>
-              <a:rPr lang="en-US" baseline="0" dirty="0" smtClean="0"/>
+              <a:rPr lang="en-US" baseline="0" dirty="0"/>
               <a:t>I used ‘</a:t>
             </a:r>
             <a:r>
-              <a:rPr lang="en-US" dirty="0" smtClean="0"/>
+              <a:rPr lang="en-US" dirty="0"/>
               <a:t>annotate("</a:t>
             </a:r>
             <a:r>
-              <a:rPr lang="en-US" dirty="0" err="1" smtClean="0"/>
+              <a:rPr lang="en-US" dirty="0" err="1"/>
               <a:t>rect</a:t>
             </a:r>
             <a:r>
-              <a:rPr lang="en-US" dirty="0" smtClean="0"/>
+              <a:rPr lang="en-US" dirty="0"/>
               <a:t>", </a:t>
             </a:r>
             <a:r>
-              <a:rPr lang="en-US" dirty="0" err="1" smtClean="0"/>
+              <a:rPr lang="en-US" dirty="0" err="1"/>
               <a:t>xmin</a:t>
             </a:r>
             <a:r>
-              <a:rPr lang="en-US" dirty="0" smtClean="0"/>
+              <a:rPr lang="en-US" dirty="0"/>
               <a:t> = 0.5, </a:t>
             </a:r>
             <a:r>
-              <a:rPr lang="en-US" dirty="0" err="1" smtClean="0"/>
+              <a:rPr lang="en-US" dirty="0" err="1"/>
               <a:t>xmax</a:t>
             </a:r>
             <a:r>
-              <a:rPr lang="en-US" dirty="0" smtClean="0"/>
+              <a:rPr lang="en-US" dirty="0"/>
               <a:t> = 9.5, </a:t>
             </a:r>
             <a:r>
-              <a:rPr lang="en-US" dirty="0" err="1" smtClean="0"/>
+              <a:rPr lang="en-US" dirty="0" err="1"/>
               <a:t>ymin</a:t>
             </a:r>
             <a:r>
-              <a:rPr lang="en-US" dirty="0" smtClean="0"/>
+              <a:rPr lang="en-US" dirty="0"/>
               <a:t> = 0, </a:t>
             </a:r>
             <a:r>
-              <a:rPr lang="en-US" dirty="0" err="1" smtClean="0"/>
+              <a:rPr lang="en-US" dirty="0" err="1"/>
               <a:t>ymax</a:t>
             </a:r>
             <a:r>
-              <a:rPr lang="en-US" dirty="0" smtClean="0"/>
+              <a:rPr lang="en-US" dirty="0"/>
               <a:t> = 27, alpha = .2, fill = "#78c679")’ (repeat</a:t>
             </a:r>
             <a:r>
-              <a:rPr lang="en-US" baseline="0" dirty="0" smtClean="0"/>
+              <a:rPr lang="en-US" baseline="0" dirty="0"/>
               <a:t> 2x more times with new </a:t>
             </a:r>
             <a:r>
-              <a:rPr lang="en-US" baseline="0" dirty="0" err="1" smtClean="0"/>
+              <a:rPr lang="en-US" baseline="0" dirty="0" err="1"/>
               <a:t>xmin</a:t>
             </a:r>
             <a:r>
-              <a:rPr lang="en-US" baseline="0" dirty="0" smtClean="0"/>
+              <a:rPr lang="en-US" baseline="0" dirty="0"/>
               <a:t>, </a:t>
             </a:r>
             <a:r>
-              <a:rPr lang="en-US" baseline="0" dirty="0" err="1" smtClean="0"/>
+              <a:rPr lang="en-US" baseline="0" dirty="0" err="1"/>
               <a:t>xmax</a:t>
             </a:r>
             <a:r>
-              <a:rPr lang="en-US" baseline="0" dirty="0" smtClean="0"/>
+              <a:rPr lang="en-US" baseline="0" dirty="0"/>
               <a:t>, and fill color.)</a:t>
             </a:r>
           </a:p>
@@ -650,12 +649,12 @@
               <a:buChar char="-"/>
             </a:pPr>
             <a:r>
-              <a:rPr lang="en-US" dirty="0" smtClean="0"/>
-              <a:t>At</a:t>
-            </a:r>
-            <a:r>
-              <a:rPr lang="en-US" baseline="0" dirty="0" smtClean="0"/>
-              <a:t> first I didn’t realize I could still use x and y values to describe the position of the shaded area in my plot, since my data was categorical on both axis. But, it turns out the lower left point is assumed to be at x = 1, y =1 and each data row is a unit of 1. I expanded the rectangle above the original plot to make room for the pH text as well. </a:t>
+              <a:rPr lang="en-US" dirty="0"/>
+              <a:t>It turns out we </a:t>
+            </a:r>
+            <a:r>
+              <a:rPr lang="en-US" baseline="0" dirty="0"/>
+              <a:t>still use x and y values to describe the position of the shaded area in plot, even if the data is categorical on both axis. The lower left point is assumed to be at x = 1, y =1 and each data row is a unit of 1. I expanded the rectangle above the original plot to make room for the pH text as well. </a:t>
             </a:r>
           </a:p>
           <a:p>
@@ -664,32 +663,32 @@
               <a:buChar char="-"/>
             </a:pPr>
             <a:r>
-              <a:rPr lang="en-US" baseline="0" dirty="0" smtClean="0"/>
+              <a:rPr lang="en-US" baseline="0" dirty="0"/>
               <a:t>I added a second call of </a:t>
             </a:r>
             <a:r>
-              <a:rPr lang="en-US" baseline="0" dirty="0" err="1" smtClean="0"/>
+              <a:rPr lang="en-US" baseline="0" dirty="0" err="1"/>
               <a:t>geom_point</a:t>
             </a:r>
             <a:r>
-              <a:rPr lang="en-US" baseline="0" dirty="0" smtClean="0"/>
+              <a:rPr lang="en-US" baseline="0" dirty="0"/>
               <a:t>() after plotting the rectangles. The rectangles initially were a layer on top of the original points, making the original points faded. However when I moved the </a:t>
             </a:r>
             <a:r>
-              <a:rPr lang="en-US" baseline="0" dirty="0" err="1" smtClean="0"/>
+              <a:rPr lang="en-US" baseline="0" dirty="0" err="1"/>
               <a:t>geom_point</a:t>
             </a:r>
             <a:r>
-              <a:rPr lang="en-US" baseline="0" dirty="0" smtClean="0"/>
-              <a:t>() to after the rectangle annotation, I would get an error. So I just added the </a:t>
-            </a:r>
-            <a:r>
-              <a:rPr lang="en-US" baseline="0" dirty="0" err="1" smtClean="0"/>
+              <a:rPr lang="en-US" baseline="0" dirty="0"/>
+              <a:t>() call to after the rectangle annotation call, I would get an error. So I just added the </a:t>
+            </a:r>
+            <a:r>
+              <a:rPr lang="en-US" baseline="0" dirty="0" err="1"/>
               <a:t>geom_point</a:t>
             </a:r>
             <a:r>
-              <a:rPr lang="en-US" baseline="0" dirty="0" smtClean="0"/>
-              <a:t>() call AGAIN, and the are replotted on top of the shaded rectangle. So, in reality, I plotted each point twice!</a:t>
+              <a:rPr lang="en-US" baseline="0" dirty="0"/>
+              <a:t>() call again, and they are replotted on top of the shaded rectangle. So I plotted each point twice!</a:t>
             </a:r>
           </a:p>
           <a:p>
@@ -698,7 +697,7 @@
               <a:buChar char="-"/>
             </a:pPr>
             <a:r>
-              <a:rPr lang="en-US" baseline="0" dirty="0" smtClean="0"/>
+              <a:rPr lang="en-US" baseline="0" dirty="0"/>
               <a:t>I added an invisible rectangle to plot B so that the y-axis was expanded in the same way as plot A. That way, the tick marks all lined up together nicely.</a:t>
             </a:r>
           </a:p>
@@ -707,7 +706,7 @@
               <a:buAutoNum type="arabicParenR"/>
             </a:pPr>
             <a:r>
-              <a:rPr lang="en-US" baseline="0" dirty="0" smtClean="0"/>
+              <a:rPr lang="en-US" baseline="0" dirty="0"/>
               <a:t>Pushing two plots next to each other so they could share the axis labels.</a:t>
             </a:r>
           </a:p>
@@ -717,23 +716,23 @@
               <a:buChar char="-"/>
             </a:pPr>
             <a:r>
-              <a:rPr lang="en-US" baseline="0" dirty="0" smtClean="0"/>
+              <a:rPr lang="en-US" baseline="0" dirty="0"/>
               <a:t>For plot A, I moved the legend to the left and the scale to the right, but then didn’t write the text using ‘theme(</a:t>
             </a:r>
             <a:r>
-              <a:rPr lang="en-US" baseline="0" dirty="0" err="1" smtClean="0"/>
+              <a:rPr lang="en-US" baseline="0" dirty="0" err="1"/>
               <a:t>axis.text.y</a:t>
             </a:r>
             <a:r>
-              <a:rPr lang="en-US" baseline="0" dirty="0" smtClean="0"/>
+              <a:rPr lang="en-US" baseline="0" dirty="0"/>
               <a:t> = </a:t>
             </a:r>
             <a:r>
-              <a:rPr lang="en-US" baseline="0" dirty="0" err="1" smtClean="0"/>
+              <a:rPr lang="en-US" baseline="0" dirty="0" err="1"/>
               <a:t>element_blank</a:t>
             </a:r>
             <a:r>
-              <a:rPr lang="en-US" baseline="0" dirty="0" smtClean="0"/>
+              <a:rPr lang="en-US" baseline="0" dirty="0"/>
               <a:t>())’. </a:t>
             </a:r>
           </a:p>
@@ -743,15 +742,15 @@
               <a:buChar char="-"/>
             </a:pPr>
             <a:r>
-              <a:rPr lang="en-US" baseline="0" dirty="0" smtClean="0"/>
-              <a:t>For plot B, I changed the left margin to -30 (negative 30, moved it to the left) with ‘theme(</a:t>
-            </a:r>
-            <a:r>
-              <a:rPr lang="en-US" baseline="0" dirty="0" err="1" smtClean="0"/>
+              <a:rPr lang="en-US" baseline="0" dirty="0"/>
+              <a:t>For plot B, I changed the left margin to -30 (-30, expanded it to the left) with ‘theme(</a:t>
+            </a:r>
+            <a:r>
+              <a:rPr lang="en-US" baseline="0" dirty="0" err="1"/>
               <a:t>plot.margin</a:t>
             </a:r>
             <a:r>
-              <a:rPr lang="en-US" baseline="0" dirty="0" smtClean="0"/>
+              <a:rPr lang="en-US" baseline="0" dirty="0"/>
               <a:t> = margin(t=0,r = 0,b =0,l = -30)’ I believe these values are pixels, and so it was trial and error related to the size I wanted the plot and the distance from plot A.</a:t>
             </a:r>
           </a:p>
@@ -761,48 +760,40 @@
               <a:buChar char="-"/>
             </a:pPr>
             <a:r>
-              <a:rPr lang="en-US" baseline="0" dirty="0" smtClean="0"/>
-              <a:t>And used ‘theme(</a:t>
-            </a:r>
-            <a:r>
-              <a:rPr lang="en-US" baseline="0" dirty="0" err="1" smtClean="0"/>
+              <a:rPr lang="en-US" baseline="0" dirty="0"/>
+              <a:t>I used ‘theme(</a:t>
+            </a:r>
+            <a:r>
+              <a:rPr lang="en-US" baseline="0" dirty="0" err="1"/>
               <a:t>axis.text.y</a:t>
             </a:r>
             <a:r>
-              <a:rPr lang="en-US" baseline="0" dirty="0" smtClean="0"/>
+              <a:rPr lang="en-US" baseline="0" dirty="0"/>
               <a:t> = </a:t>
             </a:r>
             <a:r>
-              <a:rPr lang="en-US" baseline="0" dirty="0" err="1" smtClean="0"/>
+              <a:rPr lang="en-US" baseline="0" dirty="0" err="1"/>
               <a:t>element_text</a:t>
             </a:r>
             <a:r>
-              <a:rPr lang="en-US" baseline="0" dirty="0" smtClean="0"/>
+              <a:rPr lang="en-US" baseline="0" dirty="0"/>
               <a:t>(</a:t>
             </a:r>
             <a:r>
-              <a:rPr lang="en-US" baseline="0" dirty="0" err="1" smtClean="0"/>
+              <a:rPr lang="en-US" baseline="0" dirty="0" err="1"/>
               <a:t>hjust</a:t>
             </a:r>
             <a:r>
-              <a:rPr lang="en-US" baseline="0" dirty="0" smtClean="0"/>
-              <a:t>=.5,face = "italic")’ to center justify (the </a:t>
-            </a:r>
-            <a:r>
-              <a:rPr lang="en-US" baseline="0" dirty="0" err="1" smtClean="0"/>
+              <a:rPr lang="en-US" baseline="0" dirty="0"/>
+              <a:t>=.5,face = "italic"))’ to center justify (the </a:t>
+            </a:r>
+            <a:r>
+              <a:rPr lang="en-US" baseline="0" dirty="0" err="1"/>
               <a:t>hjust</a:t>
             </a:r>
             <a:r>
-              <a:rPr lang="en-US" baseline="0" dirty="0" smtClean="0"/>
-              <a:t> scale is from 0-1, left-right, so .5 means center) and italicize the </a:t>
-            </a:r>
-            <a:r>
-              <a:rPr lang="en-US" baseline="0" dirty="0" err="1" smtClean="0"/>
-              <a:t>macroalgae</a:t>
-            </a:r>
-            <a:r>
-              <a:rPr lang="en-US" baseline="0" dirty="0" smtClean="0"/>
-              <a:t> labels.</a:t>
+              <a:rPr lang="en-US" baseline="0" dirty="0"/>
+              <a:t> scale is from 0-1, left-right, so .5 means center) and italicize the macroalgae labels.</a:t>
             </a:r>
           </a:p>
           <a:p>
@@ -811,32 +802,24 @@
               <a:buChar char="-"/>
             </a:pPr>
             <a:r>
-              <a:rPr lang="en-US" baseline="0" dirty="0" smtClean="0"/>
+              <a:rPr lang="en-US" baseline="0" dirty="0"/>
               <a:t>When I put plot A and B together, I wanted the labels A and B near the actual plot area, so I used ‘</a:t>
             </a:r>
             <a:r>
-              <a:rPr lang="en-US" baseline="0" dirty="0" err="1" smtClean="0"/>
+              <a:rPr lang="en-US" baseline="0" dirty="0" err="1"/>
               <a:t>plot_grid</a:t>
             </a:r>
             <a:r>
-              <a:rPr lang="en-US" baseline="0" dirty="0" smtClean="0"/>
+              <a:rPr lang="en-US" baseline="0" dirty="0"/>
               <a:t>(</a:t>
             </a:r>
             <a:r>
-              <a:rPr lang="en-US" baseline="0" dirty="0" err="1" smtClean="0"/>
+              <a:rPr lang="en-US" baseline="0" dirty="0" err="1"/>
               <a:t>label_x</a:t>
             </a:r>
             <a:r>
-              <a:rPr lang="en-US" baseline="0" dirty="0" smtClean="0"/>
-              <a:t> = c(.15,.25))’ to move the </a:t>
-            </a:r>
-            <a:r>
-              <a:rPr lang="en-US" baseline="0" dirty="0" err="1" smtClean="0"/>
-              <a:t>lables</a:t>
-            </a:r>
-            <a:r>
-              <a:rPr lang="en-US" baseline="0" dirty="0" smtClean="0"/>
-              <a:t> along the x axis away from where they naturally would be. I’m not sure if I like that the A is beyond the legend, but it matches where the B is on the other plot. I’m still thinking about this one.</a:t>
+              <a:rPr lang="en-US" baseline="0" dirty="0"/>
+              <a:t> = c(.15,.25))’ to move the labels along the x axis away from where they naturally would be.</a:t>
             </a:r>
           </a:p>
           <a:p>
@@ -845,32 +828,24 @@
               <a:buNone/>
             </a:pPr>
             <a:r>
-              <a:rPr lang="en-US" baseline="0" dirty="0" smtClean="0"/>
-              <a:t>4)   I used gifmaker.me to bounce between two versions of the plot, once with and one without gridlines (only works in </a:t>
-            </a:r>
-            <a:r>
-              <a:rPr lang="en-US" baseline="0" dirty="0" err="1" smtClean="0"/>
-              <a:t>ppt</a:t>
-            </a:r>
-            <a:r>
-              <a:rPr lang="en-US" baseline="0" dirty="0" smtClean="0"/>
-              <a:t> slideshow mode). I took my original ‘plot + theme(</a:t>
-            </a:r>
-            <a:r>
-              <a:rPr lang="en-US" baseline="0" dirty="0" err="1" smtClean="0"/>
+              <a:rPr lang="en-US" baseline="0" dirty="0"/>
+              <a:t>4)   I used gifmaker.me to make this gif that bounces between two versions of the plot, with vs without gridlines (only works in ppt slideshow mode). I took my original ‘plot + theme(</a:t>
+            </a:r>
+            <a:r>
+              <a:rPr lang="en-US" baseline="0" dirty="0" err="1"/>
               <a:t>panel.grid.major</a:t>
             </a:r>
             <a:r>
-              <a:rPr lang="en-US" baseline="0" dirty="0" smtClean="0"/>
+              <a:rPr lang="en-US" baseline="0" dirty="0"/>
               <a:t> = </a:t>
             </a:r>
             <a:r>
-              <a:rPr lang="en-US" baseline="0" dirty="0" err="1" smtClean="0"/>
+              <a:rPr lang="en-US" baseline="0" dirty="0" err="1"/>
               <a:t>element_blank</a:t>
             </a:r>
             <a:r>
-              <a:rPr lang="en-US" baseline="0" dirty="0" smtClean="0"/>
-              <a:t>)’ to ensure everything else stayed the exact same. I don’t know whether I prefer with or without gridlines.</a:t>
+              <a:rPr lang="en-US" baseline="0" dirty="0"/>
+              <a:t>)’ to ensure everything else stayed the exact same. I don’t know whether I prefer with or without gridlines. What do you prefer?</a:t>
             </a:r>
             <a:endParaRPr lang="en-US" dirty="0"/>
           </a:p>
@@ -956,7 +931,7 @@
           <a:bodyPr/>
           <a:lstStyle/>
           <a:p>
-            <a:pPr marL="0" marR="0" indent="0" algn="l" defTabSz="914400" rtl="0" eaLnBrk="1" fontAlgn="auto" latinLnBrk="0" hangingPunct="1">
+            <a:pPr marL="0" marR="0" lvl="0" indent="0" algn="l" defTabSz="914400" rtl="0" eaLnBrk="1" fontAlgn="auto" latinLnBrk="0" hangingPunct="1">
               <a:lnSpc>
                 <a:spcPct val="100000"/>
               </a:lnSpc>
@@ -974,114 +949,194 @@
               <a:defRPr/>
             </a:pPr>
             <a:r>
-              <a:rPr lang="en-US" sz="1200" b="0" i="0" kern="1200" dirty="0" smtClean="0">
-                <a:solidFill>
-                  <a:schemeClr val="tx1"/>
-                </a:solidFill>
-                <a:effectLst/>
-                <a:latin typeface="+mn-lt"/>
-                <a:ea typeface="+mn-ea"/>
-                <a:cs typeface="+mn-cs"/>
+              <a:rPr lang="en-US" sz="1200" dirty="0">
+                <a:latin typeface="Calibri" panose="020F0502020204030204" pitchFamily="34" charset="0"/>
+                <a:ea typeface="Calibri" panose="020F0502020204030204" pitchFamily="34" charset="0"/>
+                <a:cs typeface="Times New Roman" panose="02020603050405020304" pitchFamily="18" charset="0"/>
               </a:rPr>
-              <a:t>Ensure that a caption on the figure results in the figure being self-explanatory. You may choose figures from your own research or from the </a:t>
-            </a:r>
-            <a:r>
-              <a:rPr lang="en-US" sz="1200" b="0" i="0" kern="1200" dirty="0" err="1" smtClean="0">
-                <a:solidFill>
-                  <a:schemeClr val="tx1"/>
-                </a:solidFill>
-                <a:effectLst/>
-                <a:latin typeface="+mn-lt"/>
-                <a:ea typeface="+mn-ea"/>
-                <a:cs typeface="+mn-cs"/>
+              <a:t>NOTE: When fish consume prey, the </a:t>
+            </a:r>
+            <a:r>
+              <a:rPr lang="en-US" sz="1200" b="1" dirty="0">
+                <a:latin typeface="Calibri" panose="020F0502020204030204" pitchFamily="34" charset="0"/>
+                <a:ea typeface="Calibri" panose="020F0502020204030204" pitchFamily="34" charset="0"/>
+                <a:cs typeface="Times New Roman" panose="02020603050405020304" pitchFamily="18" charset="0"/>
               </a:rPr>
-              <a:t>Porzio</a:t>
-            </a:r>
-            <a:r>
-              <a:rPr lang="en-US" sz="1200" b="0" i="0" kern="1200" dirty="0" smtClean="0">
-                <a:solidFill>
-                  <a:schemeClr val="tx1"/>
-                </a:solidFill>
-                <a:effectLst/>
-                <a:latin typeface="+mn-lt"/>
-                <a:ea typeface="+mn-ea"/>
-                <a:cs typeface="+mn-cs"/>
+              <a:t>carbon</a:t>
+            </a:r>
+            <a:r>
+              <a:rPr lang="en-US" sz="1200" dirty="0">
+                <a:latin typeface="Calibri" panose="020F0502020204030204" pitchFamily="34" charset="0"/>
+                <a:ea typeface="Calibri" panose="020F0502020204030204" pitchFamily="34" charset="0"/>
+                <a:cs typeface="Times New Roman" panose="02020603050405020304" pitchFamily="18" charset="0"/>
               </a:rPr>
-              <a:t> paper. In the comments in PowerPoint, highlight graphical techniques that you learnt and R code, so that others can benefit from your graphical knowledge.</a:t>
-            </a:r>
-            <a:r>
-              <a:rPr lang="en-US" dirty="0" smtClean="0"/>
-              <a:t> </a:t>
-            </a:r>
-          </a:p>
-          <a:p>
-            <a:endParaRPr lang="en-US" dirty="0" smtClean="0"/>
-          </a:p>
-          <a:p>
-            <a:r>
-              <a:rPr lang="en-US" dirty="0" smtClean="0"/>
-              <a:t>This is created in base R.</a:t>
-            </a:r>
-            <a:r>
-              <a:rPr lang="en-US" baseline="0" dirty="0" smtClean="0"/>
-              <a:t> I have not successfully recreated this plot in </a:t>
-            </a:r>
-            <a:r>
-              <a:rPr lang="en-US" baseline="0" dirty="0" err="1" smtClean="0"/>
+              <a:t> assimilates into their tissue and takes on extra neutrons in away that reflects the prey, however the body tissue tends to hang onto the </a:t>
+            </a:r>
+            <a:r>
+              <a:rPr lang="en-US" sz="1200" b="1" dirty="0">
+                <a:latin typeface="Calibri" panose="020F0502020204030204" pitchFamily="34" charset="0"/>
+                <a:ea typeface="Calibri" panose="020F0502020204030204" pitchFamily="34" charset="0"/>
+                <a:cs typeface="Times New Roman" panose="02020603050405020304" pitchFamily="18" charset="0"/>
+              </a:rPr>
+              <a:t>nitrogen</a:t>
+            </a:r>
+            <a:r>
+              <a:rPr lang="en-US" sz="1200" dirty="0">
+                <a:latin typeface="Calibri" panose="020F0502020204030204" pitchFamily="34" charset="0"/>
+                <a:ea typeface="Calibri" panose="020F0502020204030204" pitchFamily="34" charset="0"/>
+                <a:cs typeface="Times New Roman" panose="02020603050405020304" pitchFamily="18" charset="0"/>
+              </a:rPr>
+              <a:t> compounds with the extra neutrons and excretes the normal nitrogen. So nitrogen in the tissue of an organism always has more nitrogen with an extra neutron (nitrogen-15) than the prey, a value that is then adjusted. That adjustment is called a Trophic Enrichment Factor (TEF).</a:t>
+            </a:r>
+          </a:p>
+          <a:p>
+            <a:pPr marL="0" marR="0" lvl="0" indent="0" algn="l" defTabSz="914400" rtl="0" eaLnBrk="1" fontAlgn="auto" latinLnBrk="0" hangingPunct="1">
+              <a:lnSpc>
+                <a:spcPct val="100000"/>
+              </a:lnSpc>
+              <a:spcBef>
+                <a:spcPts val="0"/>
+              </a:spcBef>
+              <a:spcAft>
+                <a:spcPts val="0"/>
+              </a:spcAft>
+              <a:buClrTx/>
+              <a:buSzTx/>
+              <a:buFontTx/>
+              <a:buNone/>
+              <a:tabLst/>
+              <a:defRPr/>
+            </a:pPr>
+            <a:endParaRPr lang="en-US" dirty="0"/>
+          </a:p>
+          <a:p>
+            <a:r>
+              <a:rPr lang="en-US" dirty="0"/>
+              <a:t>This plot is created in base R.</a:t>
+            </a:r>
+            <a:r>
+              <a:rPr lang="en-US" baseline="0" dirty="0"/>
+              <a:t> O</a:t>
+            </a:r>
+            <a:r>
+              <a:rPr lang="en-US" dirty="0"/>
+              <a:t>ne</a:t>
+            </a:r>
+            <a:r>
+              <a:rPr lang="en-US" baseline="0" dirty="0"/>
+              <a:t> of my takeaways of working with both systems is the miracle that is “</a:t>
+            </a:r>
+            <a:r>
+              <a:rPr lang="en-US" baseline="0" dirty="0" err="1"/>
+              <a:t>facet_wrap</a:t>
+            </a:r>
+            <a:r>
+              <a:rPr lang="en-US" baseline="0" dirty="0"/>
+              <a:t>()” in </a:t>
+            </a:r>
+            <a:r>
+              <a:rPr lang="en-US" baseline="0" dirty="0" err="1"/>
               <a:t>ggplot</a:t>
             </a:r>
             <a:r>
-              <a:rPr lang="en-US" baseline="0" dirty="0" smtClean="0"/>
-              <a:t> so alongside working to recreate it in </a:t>
-            </a:r>
-            <a:r>
-              <a:rPr lang="en-US" baseline="0" dirty="0" err="1" smtClean="0"/>
+              <a:rPr lang="en-US" baseline="0" dirty="0"/>
+              <a:t>. In base R, to create these 16 panels, I created a loop that goes through data each lake one at a time, but to get the axis different for four types of plots (y only, x only, x and y, and none) I had to write several if-else statements (about 15 lines of code). </a:t>
+            </a:r>
+            <a:r>
+              <a:rPr lang="en-US" baseline="0" dirty="0" err="1"/>
+              <a:t>Facet_wrap</a:t>
+            </a:r>
+            <a:r>
+              <a:rPr lang="en-US" baseline="0" dirty="0"/>
+              <a:t>() is mind blowing in this regard.</a:t>
+            </a:r>
+          </a:p>
+          <a:p>
+            <a:endParaRPr lang="en-US" baseline="0" dirty="0"/>
+          </a:p>
+          <a:p>
+            <a:r>
+              <a:rPr lang="en-US" baseline="0" dirty="0"/>
+              <a:t>I am working to create a similar plot with </a:t>
+            </a:r>
+            <a:r>
+              <a:rPr lang="en-US" baseline="0" dirty="0" err="1"/>
               <a:t>ggplot</a:t>
             </a:r>
             <a:r>
-              <a:rPr lang="en-US" baseline="0" dirty="0" smtClean="0"/>
-              <a:t>, I am improving it in base. </a:t>
-            </a:r>
-            <a:r>
-              <a:rPr lang="en-US" baseline="0" dirty="0" smtClean="0"/>
-              <a:t>O</a:t>
-            </a:r>
-            <a:r>
-              <a:rPr lang="en-US" dirty="0" smtClean="0"/>
-              <a:t>ne</a:t>
-            </a:r>
-            <a:r>
-              <a:rPr lang="en-US" baseline="0" dirty="0" smtClean="0"/>
-              <a:t> of my takeaways is the miracle that is “</a:t>
-            </a:r>
-            <a:r>
-              <a:rPr lang="en-US" baseline="0" dirty="0" err="1" smtClean="0"/>
-              <a:t>facet_wrap</a:t>
-            </a:r>
-            <a:r>
-              <a:rPr lang="en-US" baseline="0" dirty="0" smtClean="0"/>
-              <a:t>()” in </a:t>
-            </a:r>
-            <a:r>
-              <a:rPr lang="en-US" baseline="0" dirty="0" err="1" smtClean="0"/>
+              <a:rPr lang="en-US" baseline="0" dirty="0"/>
+              <a:t>, but a few things have not been ironed out. For example, in base I’m comfortable plotting and doing calculations simultaneously (</a:t>
+            </a:r>
+            <a:r>
+              <a:rPr lang="en-US" baseline="0" dirty="0" err="1"/>
+              <a:t>ie</a:t>
+            </a:r>
+            <a:r>
+              <a:rPr lang="en-US" baseline="0" dirty="0"/>
+              <a:t>, means and </a:t>
+            </a:r>
+            <a:r>
+              <a:rPr lang="en-US" baseline="0" dirty="0" err="1"/>
+              <a:t>sd</a:t>
+            </a:r>
+            <a:r>
+              <a:rPr lang="en-US" baseline="0" dirty="0"/>
+              <a:t> for plants, or trophic adjustments for fish). Also, I’m creating hulls based on the vertices of the calculations. It is straightforward to handle different </a:t>
+            </a:r>
+            <a:r>
+              <a:rPr lang="en-US" baseline="0" dirty="0" err="1"/>
+              <a:t>dataframes</a:t>
+            </a:r>
+            <a:r>
+              <a:rPr lang="en-US" baseline="0" dirty="0"/>
+              <a:t> differently in base, as I work on layers of a plot. </a:t>
+            </a:r>
+          </a:p>
+          <a:p>
+            <a:endParaRPr lang="en-US" baseline="0" dirty="0"/>
+          </a:p>
+          <a:p>
+            <a:r>
+              <a:rPr lang="en-US" baseline="0" dirty="0"/>
+              <a:t>I’m struggling to do different things with different types of data in </a:t>
+            </a:r>
+            <a:r>
+              <a:rPr lang="en-US" baseline="0" dirty="0" err="1"/>
               <a:t>ggplot</a:t>
             </a:r>
             <a:r>
-              <a:rPr lang="en-US" baseline="0" dirty="0" smtClean="0"/>
-              <a:t>. </a:t>
-            </a:r>
-            <a:r>
-              <a:rPr lang="en-US" baseline="0" dirty="0" smtClean="0"/>
-              <a:t>In base R, it loops through data from 16 lakes and creates the same plot each time, however, to get the axis different for four types of plots (y only, x only, x and y, and none) I had to write several if else statements! Essentially 15 lines of code in base that </a:t>
-            </a:r>
-            <a:r>
-              <a:rPr lang="en-US" baseline="0" dirty="0" err="1" smtClean="0"/>
-              <a:t>ggplot</a:t>
-            </a:r>
-            <a:r>
-              <a:rPr lang="en-US" baseline="0" dirty="0" smtClean="0"/>
-              <a:t> does in one. However, in this plot I am doing the calculation of the mean of one type of data, but not the others.</a:t>
-            </a:r>
+              <a:rPr lang="en-US" baseline="0" dirty="0"/>
+              <a:t>(). I trust it will come, but the first big realization is that my original data needs to be in one giant </a:t>
+            </a:r>
+            <a:r>
+              <a:rPr lang="en-US" baseline="0" dirty="0" err="1"/>
+              <a:t>dataframe</a:t>
+            </a:r>
+            <a:r>
+              <a:rPr lang="en-US" baseline="0" dirty="0"/>
+              <a:t>, which is a new approach and different starting point.</a:t>
+            </a:r>
+          </a:p>
+          <a:p>
+            <a:endParaRPr lang="en-US" baseline="0" dirty="0"/>
+          </a:p>
+          <a:p>
+            <a:r>
+              <a:rPr lang="en-US" sz="1200" dirty="0">
+                <a:latin typeface="Calibri" panose="020F0502020204030204" pitchFamily="34" charset="0"/>
+                <a:ea typeface="Calibri" panose="020F0502020204030204" pitchFamily="34" charset="0"/>
+                <a:cs typeface="Times New Roman" panose="02020603050405020304" pitchFamily="18" charset="0"/>
+              </a:rPr>
+              <a:t>Comment: Each panel is called an isotope biplot and for my research, an isotope biplot for each lake is expected, even if the plot ends up in the supplementary materials of a publication. My goal is to get as much “required” information into as clean of a space as possible.</a:t>
+            </a:r>
+          </a:p>
+          <a:p>
+            <a:endParaRPr lang="en-US" sz="1200" dirty="0">
+              <a:latin typeface="Calibri" panose="020F0502020204030204" pitchFamily="34" charset="0"/>
+              <a:cs typeface="Times New Roman" panose="02020603050405020304" pitchFamily="18" charset="0"/>
+            </a:endParaRPr>
+          </a:p>
+          <a:p>
             <a:endParaRPr lang="en-US" dirty="0"/>
           </a:p>
         </p:txBody>
@@ -1164,7 +1219,7 @@
           </a:lstStyle>
           <a:p>
             <a:r>
-              <a:rPr lang="en-US" smtClean="0"/>
+              <a:rPr lang="en-US"/>
               <a:t>Click to edit Master title style</a:t>
             </a:r>
             <a:endParaRPr lang="en-US" dirty="0"/>
@@ -1229,7 +1284,7 @@
           </a:lstStyle>
           <a:p>
             <a:r>
-              <a:rPr lang="en-US" smtClean="0"/>
+              <a:rPr lang="en-US"/>
               <a:t>Click to edit Master subtitle style</a:t>
             </a:r>
             <a:endParaRPr lang="en-US" dirty="0"/>
@@ -1253,7 +1308,7 @@
           <a:p>
             <a:fld id="{B8EFB599-F43F-4647-9C9E-E0D26680C4B0}" type="datetimeFigureOut">
               <a:rPr lang="en-US" smtClean="0"/>
-              <a:t>3/13/2020</a:t>
+              <a:t>3/13/20</a:t>
             </a:fld>
             <a:endParaRPr lang="en-US"/>
           </a:p>
@@ -1304,7 +1359,7 @@
     </p:spTree>
     <p:extLst>
       <p:ext uri="{BB962C8B-B14F-4D97-AF65-F5344CB8AC3E}">
-        <p14:creationId xmlns:p14="http://schemas.microsoft.com/office/powerpoint/2010/main" val="3885525384"/>
+        <p14:creationId xmlns:p14="http://schemas.microsoft.com/office/powerpoint/2010/main" val="4090911731"/>
       </p:ext>
     </p:extLst>
   </p:cSld>
@@ -1347,7 +1402,7 @@
           <a:lstStyle/>
           <a:p>
             <a:r>
-              <a:rPr lang="en-US" smtClean="0"/>
+              <a:rPr lang="en-US"/>
               <a:t>Click to edit Master title style</a:t>
             </a:r>
             <a:endParaRPr lang="en-US" dirty="0"/>
@@ -1371,35 +1426,35 @@
           <a:p>
             <a:pPr lvl="0"/>
             <a:r>
-              <a:rPr lang="en-US" smtClean="0"/>
-              <a:t>Edit Master text styles</a:t>
+              <a:rPr lang="en-US"/>
+              <a:t>Click to edit Master text styles</a:t>
             </a:r>
           </a:p>
           <a:p>
             <a:pPr lvl="1"/>
             <a:r>
-              <a:rPr lang="en-US" smtClean="0"/>
+              <a:rPr lang="en-US"/>
               <a:t>Second level</a:t>
             </a:r>
           </a:p>
           <a:p>
             <a:pPr lvl="2"/>
             <a:r>
-              <a:rPr lang="en-US" smtClean="0"/>
+              <a:rPr lang="en-US"/>
               <a:t>Third level</a:t>
             </a:r>
           </a:p>
           <a:p>
             <a:pPr lvl="3"/>
             <a:r>
-              <a:rPr lang="en-US" smtClean="0"/>
+              <a:rPr lang="en-US"/>
               <a:t>Fourth level</a:t>
             </a:r>
           </a:p>
           <a:p>
             <a:pPr lvl="4"/>
             <a:r>
-              <a:rPr lang="en-US" smtClean="0"/>
+              <a:rPr lang="en-US"/>
               <a:t>Fifth level</a:t>
             </a:r>
             <a:endParaRPr lang="en-US" dirty="0"/>
@@ -1423,7 +1478,7 @@
           <a:p>
             <a:fld id="{B8EFB599-F43F-4647-9C9E-E0D26680C4B0}" type="datetimeFigureOut">
               <a:rPr lang="en-US" smtClean="0"/>
-              <a:t>3/13/2020</a:t>
+              <a:t>3/13/20</a:t>
             </a:fld>
             <a:endParaRPr lang="en-US"/>
           </a:p>
@@ -1474,7 +1529,7 @@
     </p:spTree>
     <p:extLst>
       <p:ext uri="{BB962C8B-B14F-4D97-AF65-F5344CB8AC3E}">
-        <p14:creationId xmlns:p14="http://schemas.microsoft.com/office/powerpoint/2010/main" val="212577348"/>
+        <p14:creationId xmlns:p14="http://schemas.microsoft.com/office/powerpoint/2010/main" val="2098845055"/>
       </p:ext>
     </p:extLst>
   </p:cSld>
@@ -1522,7 +1577,7 @@
           <a:lstStyle/>
           <a:p>
             <a:r>
-              <a:rPr lang="en-US" smtClean="0"/>
+              <a:rPr lang="en-US"/>
               <a:t>Click to edit Master title style</a:t>
             </a:r>
             <a:endParaRPr lang="en-US" dirty="0"/>
@@ -1551,35 +1606,35 @@
           <a:p>
             <a:pPr lvl="0"/>
             <a:r>
-              <a:rPr lang="en-US" smtClean="0"/>
-              <a:t>Edit Master text styles</a:t>
+              <a:rPr lang="en-US"/>
+              <a:t>Click to edit Master text styles</a:t>
             </a:r>
           </a:p>
           <a:p>
             <a:pPr lvl="1"/>
             <a:r>
-              <a:rPr lang="en-US" smtClean="0"/>
+              <a:rPr lang="en-US"/>
               <a:t>Second level</a:t>
             </a:r>
           </a:p>
           <a:p>
             <a:pPr lvl="2"/>
             <a:r>
-              <a:rPr lang="en-US" smtClean="0"/>
+              <a:rPr lang="en-US"/>
               <a:t>Third level</a:t>
             </a:r>
           </a:p>
           <a:p>
             <a:pPr lvl="3"/>
             <a:r>
-              <a:rPr lang="en-US" smtClean="0"/>
+              <a:rPr lang="en-US"/>
               <a:t>Fourth level</a:t>
             </a:r>
           </a:p>
           <a:p>
             <a:pPr lvl="4"/>
             <a:r>
-              <a:rPr lang="en-US" smtClean="0"/>
+              <a:rPr lang="en-US"/>
               <a:t>Fifth level</a:t>
             </a:r>
             <a:endParaRPr lang="en-US" dirty="0"/>
@@ -1603,7 +1658,7 @@
           <a:p>
             <a:fld id="{B8EFB599-F43F-4647-9C9E-E0D26680C4B0}" type="datetimeFigureOut">
               <a:rPr lang="en-US" smtClean="0"/>
-              <a:t>3/13/2020</a:t>
+              <a:t>3/13/20</a:t>
             </a:fld>
             <a:endParaRPr lang="en-US"/>
           </a:p>
@@ -1654,7 +1709,7 @@
     </p:spTree>
     <p:extLst>
       <p:ext uri="{BB962C8B-B14F-4D97-AF65-F5344CB8AC3E}">
-        <p14:creationId xmlns:p14="http://schemas.microsoft.com/office/powerpoint/2010/main" val="3848031655"/>
+        <p14:creationId xmlns:p14="http://schemas.microsoft.com/office/powerpoint/2010/main" val="1829797699"/>
       </p:ext>
     </p:extLst>
   </p:cSld>
@@ -1697,7 +1752,7 @@
           <a:lstStyle/>
           <a:p>
             <a:r>
-              <a:rPr lang="en-US" smtClean="0"/>
+              <a:rPr lang="en-US"/>
               <a:t>Click to edit Master title style</a:t>
             </a:r>
             <a:endParaRPr lang="en-US" dirty="0"/>
@@ -1721,35 +1776,35 @@
           <a:p>
             <a:pPr lvl="0"/>
             <a:r>
-              <a:rPr lang="en-US" smtClean="0"/>
-              <a:t>Edit Master text styles</a:t>
+              <a:rPr lang="en-US"/>
+              <a:t>Click to edit Master text styles</a:t>
             </a:r>
           </a:p>
           <a:p>
             <a:pPr lvl="1"/>
             <a:r>
-              <a:rPr lang="en-US" smtClean="0"/>
+              <a:rPr lang="en-US"/>
               <a:t>Second level</a:t>
             </a:r>
           </a:p>
           <a:p>
             <a:pPr lvl="2"/>
             <a:r>
-              <a:rPr lang="en-US" smtClean="0"/>
+              <a:rPr lang="en-US"/>
               <a:t>Third level</a:t>
             </a:r>
           </a:p>
           <a:p>
             <a:pPr lvl="3"/>
             <a:r>
-              <a:rPr lang="en-US" smtClean="0"/>
+              <a:rPr lang="en-US"/>
               <a:t>Fourth level</a:t>
             </a:r>
           </a:p>
           <a:p>
             <a:pPr lvl="4"/>
             <a:r>
-              <a:rPr lang="en-US" smtClean="0"/>
+              <a:rPr lang="en-US"/>
               <a:t>Fifth level</a:t>
             </a:r>
             <a:endParaRPr lang="en-US" dirty="0"/>
@@ -1773,7 +1828,7 @@
           <a:p>
             <a:fld id="{B8EFB599-F43F-4647-9C9E-E0D26680C4B0}" type="datetimeFigureOut">
               <a:rPr lang="en-US" smtClean="0"/>
-              <a:t>3/13/2020</a:t>
+              <a:t>3/13/20</a:t>
             </a:fld>
             <a:endParaRPr lang="en-US"/>
           </a:p>
@@ -1824,7 +1879,7 @@
     </p:spTree>
     <p:extLst>
       <p:ext uri="{BB962C8B-B14F-4D97-AF65-F5344CB8AC3E}">
-        <p14:creationId xmlns:p14="http://schemas.microsoft.com/office/powerpoint/2010/main" val="596928812"/>
+        <p14:creationId xmlns:p14="http://schemas.microsoft.com/office/powerpoint/2010/main" val="2567628302"/>
       </p:ext>
     </p:extLst>
   </p:cSld>
@@ -1876,7 +1931,7 @@
           </a:lstStyle>
           <a:p>
             <a:r>
-              <a:rPr lang="en-US" smtClean="0"/>
+              <a:rPr lang="en-US"/>
               <a:t>Click to edit Master title style</a:t>
             </a:r>
             <a:endParaRPr lang="en-US" dirty="0"/>
@@ -1994,8 +2049,8 @@
           <a:p>
             <a:pPr lvl="0"/>
             <a:r>
-              <a:rPr lang="en-US" smtClean="0"/>
-              <a:t>Edit Master text styles</a:t>
+              <a:rPr lang="en-US"/>
+              <a:t>Click to edit Master text styles</a:t>
             </a:r>
           </a:p>
         </p:txBody>
@@ -2017,7 +2072,7 @@
           <a:p>
             <a:fld id="{B8EFB599-F43F-4647-9C9E-E0D26680C4B0}" type="datetimeFigureOut">
               <a:rPr lang="en-US" smtClean="0"/>
-              <a:t>3/13/2020</a:t>
+              <a:t>3/13/20</a:t>
             </a:fld>
             <a:endParaRPr lang="en-US"/>
           </a:p>
@@ -2068,7 +2123,7 @@
     </p:spTree>
     <p:extLst>
       <p:ext uri="{BB962C8B-B14F-4D97-AF65-F5344CB8AC3E}">
-        <p14:creationId xmlns:p14="http://schemas.microsoft.com/office/powerpoint/2010/main" val="2153236605"/>
+        <p14:creationId xmlns:p14="http://schemas.microsoft.com/office/powerpoint/2010/main" val="2017392585"/>
       </p:ext>
     </p:extLst>
   </p:cSld>
@@ -2111,7 +2166,7 @@
           <a:lstStyle/>
           <a:p>
             <a:r>
-              <a:rPr lang="en-US" smtClean="0"/>
+              <a:rPr lang="en-US"/>
               <a:t>Click to edit Master title style</a:t>
             </a:r>
             <a:endParaRPr lang="en-US" dirty="0"/>
@@ -2140,35 +2195,35 @@
           <a:p>
             <a:pPr lvl="0"/>
             <a:r>
-              <a:rPr lang="en-US" smtClean="0"/>
-              <a:t>Edit Master text styles</a:t>
+              <a:rPr lang="en-US"/>
+              <a:t>Click to edit Master text styles</a:t>
             </a:r>
           </a:p>
           <a:p>
             <a:pPr lvl="1"/>
             <a:r>
-              <a:rPr lang="en-US" smtClean="0"/>
+              <a:rPr lang="en-US"/>
               <a:t>Second level</a:t>
             </a:r>
           </a:p>
           <a:p>
             <a:pPr lvl="2"/>
             <a:r>
-              <a:rPr lang="en-US" smtClean="0"/>
+              <a:rPr lang="en-US"/>
               <a:t>Third level</a:t>
             </a:r>
           </a:p>
           <a:p>
             <a:pPr lvl="3"/>
             <a:r>
-              <a:rPr lang="en-US" smtClean="0"/>
+              <a:rPr lang="en-US"/>
               <a:t>Fourth level</a:t>
             </a:r>
           </a:p>
           <a:p>
             <a:pPr lvl="4"/>
             <a:r>
-              <a:rPr lang="en-US" smtClean="0"/>
+              <a:rPr lang="en-US"/>
               <a:t>Fifth level</a:t>
             </a:r>
             <a:endParaRPr lang="en-US" dirty="0"/>
@@ -2197,35 +2252,35 @@
           <a:p>
             <a:pPr lvl="0"/>
             <a:r>
-              <a:rPr lang="en-US" smtClean="0"/>
-              <a:t>Edit Master text styles</a:t>
+              <a:rPr lang="en-US"/>
+              <a:t>Click to edit Master text styles</a:t>
             </a:r>
           </a:p>
           <a:p>
             <a:pPr lvl="1"/>
             <a:r>
-              <a:rPr lang="en-US" smtClean="0"/>
+              <a:rPr lang="en-US"/>
               <a:t>Second level</a:t>
             </a:r>
           </a:p>
           <a:p>
             <a:pPr lvl="2"/>
             <a:r>
-              <a:rPr lang="en-US" smtClean="0"/>
+              <a:rPr lang="en-US"/>
               <a:t>Third level</a:t>
             </a:r>
           </a:p>
           <a:p>
             <a:pPr lvl="3"/>
             <a:r>
-              <a:rPr lang="en-US" smtClean="0"/>
+              <a:rPr lang="en-US"/>
               <a:t>Fourth level</a:t>
             </a:r>
           </a:p>
           <a:p>
             <a:pPr lvl="4"/>
             <a:r>
-              <a:rPr lang="en-US" smtClean="0"/>
+              <a:rPr lang="en-US"/>
               <a:t>Fifth level</a:t>
             </a:r>
             <a:endParaRPr lang="en-US" dirty="0"/>
@@ -2249,7 +2304,7 @@
           <a:p>
             <a:fld id="{B8EFB599-F43F-4647-9C9E-E0D26680C4B0}" type="datetimeFigureOut">
               <a:rPr lang="en-US" smtClean="0"/>
-              <a:t>3/13/2020</a:t>
+              <a:t>3/13/20</a:t>
             </a:fld>
             <a:endParaRPr lang="en-US"/>
           </a:p>
@@ -2300,7 +2355,7 @@
     </p:spTree>
     <p:extLst>
       <p:ext uri="{BB962C8B-B14F-4D97-AF65-F5344CB8AC3E}">
-        <p14:creationId xmlns:p14="http://schemas.microsoft.com/office/powerpoint/2010/main" val="932747799"/>
+        <p14:creationId xmlns:p14="http://schemas.microsoft.com/office/powerpoint/2010/main" val="3769483182"/>
       </p:ext>
     </p:extLst>
   </p:cSld>
@@ -2348,7 +2403,7 @@
           <a:lstStyle/>
           <a:p>
             <a:r>
-              <a:rPr lang="en-US" smtClean="0"/>
+              <a:rPr lang="en-US"/>
               <a:t>Click to edit Master title style</a:t>
             </a:r>
             <a:endParaRPr lang="en-US" dirty="0"/>
@@ -2414,8 +2469,8 @@
           <a:p>
             <a:pPr lvl="0"/>
             <a:r>
-              <a:rPr lang="en-US" smtClean="0"/>
-              <a:t>Edit Master text styles</a:t>
+              <a:rPr lang="en-US"/>
+              <a:t>Click to edit Master text styles</a:t>
             </a:r>
           </a:p>
         </p:txBody>
@@ -2442,35 +2497,35 @@
           <a:p>
             <a:pPr lvl="0"/>
             <a:r>
-              <a:rPr lang="en-US" smtClean="0"/>
-              <a:t>Edit Master text styles</a:t>
+              <a:rPr lang="en-US"/>
+              <a:t>Click to edit Master text styles</a:t>
             </a:r>
           </a:p>
           <a:p>
             <a:pPr lvl="1"/>
             <a:r>
-              <a:rPr lang="en-US" smtClean="0"/>
+              <a:rPr lang="en-US"/>
               <a:t>Second level</a:t>
             </a:r>
           </a:p>
           <a:p>
             <a:pPr lvl="2"/>
             <a:r>
-              <a:rPr lang="en-US" smtClean="0"/>
+              <a:rPr lang="en-US"/>
               <a:t>Third level</a:t>
             </a:r>
           </a:p>
           <a:p>
             <a:pPr lvl="3"/>
             <a:r>
-              <a:rPr lang="en-US" smtClean="0"/>
+              <a:rPr lang="en-US"/>
               <a:t>Fourth level</a:t>
             </a:r>
           </a:p>
           <a:p>
             <a:pPr lvl="4"/>
             <a:r>
-              <a:rPr lang="en-US" smtClean="0"/>
+              <a:rPr lang="en-US"/>
               <a:t>Fifth level</a:t>
             </a:r>
             <a:endParaRPr lang="en-US" dirty="0"/>
@@ -2536,8 +2591,8 @@
           <a:p>
             <a:pPr lvl="0"/>
             <a:r>
-              <a:rPr lang="en-US" smtClean="0"/>
-              <a:t>Edit Master text styles</a:t>
+              <a:rPr lang="en-US"/>
+              <a:t>Click to edit Master text styles</a:t>
             </a:r>
           </a:p>
         </p:txBody>
@@ -2564,35 +2619,35 @@
           <a:p>
             <a:pPr lvl="0"/>
             <a:r>
-              <a:rPr lang="en-US" smtClean="0"/>
-              <a:t>Edit Master text styles</a:t>
+              <a:rPr lang="en-US"/>
+              <a:t>Click to edit Master text styles</a:t>
             </a:r>
           </a:p>
           <a:p>
             <a:pPr lvl="1"/>
             <a:r>
-              <a:rPr lang="en-US" smtClean="0"/>
+              <a:rPr lang="en-US"/>
               <a:t>Second level</a:t>
             </a:r>
           </a:p>
           <a:p>
             <a:pPr lvl="2"/>
             <a:r>
-              <a:rPr lang="en-US" smtClean="0"/>
+              <a:rPr lang="en-US"/>
               <a:t>Third level</a:t>
             </a:r>
           </a:p>
           <a:p>
             <a:pPr lvl="3"/>
             <a:r>
-              <a:rPr lang="en-US" smtClean="0"/>
+              <a:rPr lang="en-US"/>
               <a:t>Fourth level</a:t>
             </a:r>
           </a:p>
           <a:p>
             <a:pPr lvl="4"/>
             <a:r>
-              <a:rPr lang="en-US" smtClean="0"/>
+              <a:rPr lang="en-US"/>
               <a:t>Fifth level</a:t>
             </a:r>
             <a:endParaRPr lang="en-US" dirty="0"/>
@@ -2616,7 +2671,7 @@
           <a:p>
             <a:fld id="{B8EFB599-F43F-4647-9C9E-E0D26680C4B0}" type="datetimeFigureOut">
               <a:rPr lang="en-US" smtClean="0"/>
-              <a:t>3/13/2020</a:t>
+              <a:t>3/13/20</a:t>
             </a:fld>
             <a:endParaRPr lang="en-US"/>
           </a:p>
@@ -2667,7 +2722,7 @@
     </p:spTree>
     <p:extLst>
       <p:ext uri="{BB962C8B-B14F-4D97-AF65-F5344CB8AC3E}">
-        <p14:creationId xmlns:p14="http://schemas.microsoft.com/office/powerpoint/2010/main" val="587012382"/>
+        <p14:creationId xmlns:p14="http://schemas.microsoft.com/office/powerpoint/2010/main" val="3511984611"/>
       </p:ext>
     </p:extLst>
   </p:cSld>
@@ -2710,7 +2765,7 @@
           <a:lstStyle/>
           <a:p>
             <a:r>
-              <a:rPr lang="en-US" smtClean="0"/>
+              <a:rPr lang="en-US"/>
               <a:t>Click to edit Master title style</a:t>
             </a:r>
             <a:endParaRPr lang="en-US" dirty="0"/>
@@ -2734,7 +2789,7 @@
           <a:p>
             <a:fld id="{B8EFB599-F43F-4647-9C9E-E0D26680C4B0}" type="datetimeFigureOut">
               <a:rPr lang="en-US" smtClean="0"/>
-              <a:t>3/13/2020</a:t>
+              <a:t>3/13/20</a:t>
             </a:fld>
             <a:endParaRPr lang="en-US"/>
           </a:p>
@@ -2785,7 +2840,7 @@
     </p:spTree>
     <p:extLst>
       <p:ext uri="{BB962C8B-B14F-4D97-AF65-F5344CB8AC3E}">
-        <p14:creationId xmlns:p14="http://schemas.microsoft.com/office/powerpoint/2010/main" val="2778771902"/>
+        <p14:creationId xmlns:p14="http://schemas.microsoft.com/office/powerpoint/2010/main" val="3613945217"/>
       </p:ext>
     </p:extLst>
   </p:cSld>
@@ -2829,7 +2884,7 @@
           <a:p>
             <a:fld id="{B8EFB599-F43F-4647-9C9E-E0D26680C4B0}" type="datetimeFigureOut">
               <a:rPr lang="en-US" smtClean="0"/>
-              <a:t>3/13/2020</a:t>
+              <a:t>3/13/20</a:t>
             </a:fld>
             <a:endParaRPr lang="en-US"/>
           </a:p>
@@ -2880,7 +2935,7 @@
     </p:spTree>
     <p:extLst>
       <p:ext uri="{BB962C8B-B14F-4D97-AF65-F5344CB8AC3E}">
-        <p14:creationId xmlns:p14="http://schemas.microsoft.com/office/powerpoint/2010/main" val="1454282287"/>
+        <p14:creationId xmlns:p14="http://schemas.microsoft.com/office/powerpoint/2010/main" val="3085741953"/>
       </p:ext>
     </p:extLst>
   </p:cSld>
@@ -2932,7 +2987,7 @@
           </a:lstStyle>
           <a:p>
             <a:r>
-              <a:rPr lang="en-US" smtClean="0"/>
+              <a:rPr lang="en-US"/>
               <a:t>Click to edit Master title style</a:t>
             </a:r>
             <a:endParaRPr lang="en-US" dirty="0"/>
@@ -2989,35 +3044,35 @@
           <a:p>
             <a:pPr lvl="0"/>
             <a:r>
-              <a:rPr lang="en-US" smtClean="0"/>
-              <a:t>Edit Master text styles</a:t>
+              <a:rPr lang="en-US"/>
+              <a:t>Click to edit Master text styles</a:t>
             </a:r>
           </a:p>
           <a:p>
             <a:pPr lvl="1"/>
             <a:r>
-              <a:rPr lang="en-US" smtClean="0"/>
+              <a:rPr lang="en-US"/>
               <a:t>Second level</a:t>
             </a:r>
           </a:p>
           <a:p>
             <a:pPr lvl="2"/>
             <a:r>
-              <a:rPr lang="en-US" smtClean="0"/>
+              <a:rPr lang="en-US"/>
               <a:t>Third level</a:t>
             </a:r>
           </a:p>
           <a:p>
             <a:pPr lvl="3"/>
             <a:r>
-              <a:rPr lang="en-US" smtClean="0"/>
+              <a:rPr lang="en-US"/>
               <a:t>Fourth level</a:t>
             </a:r>
           </a:p>
           <a:p>
             <a:pPr lvl="4"/>
             <a:r>
-              <a:rPr lang="en-US" smtClean="0"/>
+              <a:rPr lang="en-US"/>
               <a:t>Fifth level</a:t>
             </a:r>
             <a:endParaRPr lang="en-US" dirty="0"/>
@@ -3083,8 +3138,8 @@
           <a:p>
             <a:pPr lvl="0"/>
             <a:r>
-              <a:rPr lang="en-US" smtClean="0"/>
-              <a:t>Edit Master text styles</a:t>
+              <a:rPr lang="en-US"/>
+              <a:t>Click to edit Master text styles</a:t>
             </a:r>
           </a:p>
         </p:txBody>
@@ -3106,7 +3161,7 @@
           <a:p>
             <a:fld id="{B8EFB599-F43F-4647-9C9E-E0D26680C4B0}" type="datetimeFigureOut">
               <a:rPr lang="en-US" smtClean="0"/>
-              <a:t>3/13/2020</a:t>
+              <a:t>3/13/20</a:t>
             </a:fld>
             <a:endParaRPr lang="en-US"/>
           </a:p>
@@ -3157,7 +3212,7 @@
     </p:spTree>
     <p:extLst>
       <p:ext uri="{BB962C8B-B14F-4D97-AF65-F5344CB8AC3E}">
-        <p14:creationId xmlns:p14="http://schemas.microsoft.com/office/powerpoint/2010/main" val="1895604469"/>
+        <p14:creationId xmlns:p14="http://schemas.microsoft.com/office/powerpoint/2010/main" val="3746484787"/>
       </p:ext>
     </p:extLst>
   </p:cSld>
@@ -3209,7 +3264,7 @@
           </a:lstStyle>
           <a:p>
             <a:r>
-              <a:rPr lang="en-US" smtClean="0"/>
+              <a:rPr lang="en-US"/>
               <a:t>Click to edit Master title style</a:t>
             </a:r>
             <a:endParaRPr lang="en-US" dirty="0"/>
@@ -3274,7 +3329,7 @@
           </a:lstStyle>
           <a:p>
             <a:r>
-              <a:rPr lang="en-US" smtClean="0"/>
+              <a:rPr lang="en-US"/>
               <a:t>Click icon to add picture</a:t>
             </a:r>
             <a:endParaRPr lang="en-US" dirty="0"/>
@@ -3340,8 +3395,8 @@
           <a:p>
             <a:pPr lvl="0"/>
             <a:r>
-              <a:rPr lang="en-US" smtClean="0"/>
-              <a:t>Edit Master text styles</a:t>
+              <a:rPr lang="en-US"/>
+              <a:t>Click to edit Master text styles</a:t>
             </a:r>
           </a:p>
         </p:txBody>
@@ -3363,7 +3418,7 @@
           <a:p>
             <a:fld id="{B8EFB599-F43F-4647-9C9E-E0D26680C4B0}" type="datetimeFigureOut">
               <a:rPr lang="en-US" smtClean="0"/>
-              <a:t>3/13/2020</a:t>
+              <a:t>3/13/20</a:t>
             </a:fld>
             <a:endParaRPr lang="en-US"/>
           </a:p>
@@ -3414,7 +3469,7 @@
     </p:spTree>
     <p:extLst>
       <p:ext uri="{BB962C8B-B14F-4D97-AF65-F5344CB8AC3E}">
-        <p14:creationId xmlns:p14="http://schemas.microsoft.com/office/powerpoint/2010/main" val="1353540919"/>
+        <p14:creationId xmlns:p14="http://schemas.microsoft.com/office/powerpoint/2010/main" val="587578234"/>
       </p:ext>
     </p:extLst>
   </p:cSld>
@@ -3472,7 +3527,7 @@
           <a:lstStyle/>
           <a:p>
             <a:r>
-              <a:rPr lang="en-US" smtClean="0"/>
+              <a:rPr lang="en-US"/>
               <a:t>Click to edit Master title style</a:t>
             </a:r>
             <a:endParaRPr lang="en-US" dirty="0"/>
@@ -3506,35 +3561,35 @@
           <a:p>
             <a:pPr lvl="0"/>
             <a:r>
-              <a:rPr lang="en-US" smtClean="0"/>
-              <a:t>Edit Master text styles</a:t>
+              <a:rPr lang="en-US"/>
+              <a:t>Click to edit Master text styles</a:t>
             </a:r>
           </a:p>
           <a:p>
             <a:pPr lvl="1"/>
             <a:r>
-              <a:rPr lang="en-US" smtClean="0"/>
+              <a:rPr lang="en-US"/>
               <a:t>Second level</a:t>
             </a:r>
           </a:p>
           <a:p>
             <a:pPr lvl="2"/>
             <a:r>
-              <a:rPr lang="en-US" smtClean="0"/>
+              <a:rPr lang="en-US"/>
               <a:t>Third level</a:t>
             </a:r>
           </a:p>
           <a:p>
             <a:pPr lvl="3"/>
             <a:r>
-              <a:rPr lang="en-US" smtClean="0"/>
+              <a:rPr lang="en-US"/>
               <a:t>Fourth level</a:t>
             </a:r>
           </a:p>
           <a:p>
             <a:pPr lvl="4"/>
             <a:r>
-              <a:rPr lang="en-US" smtClean="0"/>
+              <a:rPr lang="en-US"/>
               <a:t>Fifth level</a:t>
             </a:r>
             <a:endParaRPr lang="en-US" dirty="0"/>
@@ -3576,7 +3631,7 @@
           <a:p>
             <a:fld id="{B8EFB599-F43F-4647-9C9E-E0D26680C4B0}" type="datetimeFigureOut">
               <a:rPr lang="en-US" smtClean="0"/>
-              <a:t>3/13/2020</a:t>
+              <a:t>3/13/20</a:t>
             </a:fld>
             <a:endParaRPr lang="en-US"/>
           </a:p>
@@ -3663,23 +3718,23 @@
     </p:spTree>
     <p:extLst>
       <p:ext uri="{BB962C8B-B14F-4D97-AF65-F5344CB8AC3E}">
-        <p14:creationId xmlns:p14="http://schemas.microsoft.com/office/powerpoint/2010/main" val="523195858"/>
+        <p14:creationId xmlns:p14="http://schemas.microsoft.com/office/powerpoint/2010/main" val="2661804149"/>
       </p:ext>
     </p:extLst>
   </p:cSld>
   <p:clrMap bg1="lt1" tx1="dk1" bg2="lt2" tx2="dk2" accent1="accent1" accent2="accent2" accent3="accent3" accent4="accent4" accent5="accent5" accent6="accent6" hlink="hlink" folHlink="folHlink"/>
   <p:sldLayoutIdLst>
-    <p:sldLayoutId id="2147483661" r:id="rId1"/>
-    <p:sldLayoutId id="2147483662" r:id="rId2"/>
-    <p:sldLayoutId id="2147483663" r:id="rId3"/>
-    <p:sldLayoutId id="2147483664" r:id="rId4"/>
-    <p:sldLayoutId id="2147483665" r:id="rId5"/>
-    <p:sldLayoutId id="2147483666" r:id="rId6"/>
-    <p:sldLayoutId id="2147483667" r:id="rId7"/>
-    <p:sldLayoutId id="2147483668" r:id="rId8"/>
-    <p:sldLayoutId id="2147483669" r:id="rId9"/>
-    <p:sldLayoutId id="2147483670" r:id="rId10"/>
-    <p:sldLayoutId id="2147483671" r:id="rId11"/>
+    <p:sldLayoutId id="2147483673" r:id="rId1"/>
+    <p:sldLayoutId id="2147483674" r:id="rId2"/>
+    <p:sldLayoutId id="2147483675" r:id="rId3"/>
+    <p:sldLayoutId id="2147483676" r:id="rId4"/>
+    <p:sldLayoutId id="2147483677" r:id="rId5"/>
+    <p:sldLayoutId id="2147483678" r:id="rId6"/>
+    <p:sldLayoutId id="2147483679" r:id="rId7"/>
+    <p:sldLayoutId id="2147483680" r:id="rId8"/>
+    <p:sldLayoutId id="2147483681" r:id="rId9"/>
+    <p:sldLayoutId id="2147483682" r:id="rId10"/>
+    <p:sldLayoutId id="2147483683" r:id="rId11"/>
   </p:sldLayoutIdLst>
   <p:txStyles>
     <p:titleStyle>
@@ -4034,142 +4089,133 @@
           <a:lstStyle/>
           <a:p>
             <a:r>
-              <a:rPr lang="en-US" sz="1400" dirty="0" smtClean="0"/>
+              <a:rPr lang="en-US" sz="1400" dirty="0"/>
               <a:t>Animation 1. Changes in </a:t>
             </a:r>
             <a:r>
-              <a:rPr lang="en-US" sz="1400" dirty="0" err="1" smtClean="0"/>
+              <a:rPr lang="en-US" sz="1400" dirty="0" err="1"/>
               <a:t>macroalgae</a:t>
             </a:r>
             <a:r>
-              <a:rPr lang="en-US" sz="1400" dirty="0" smtClean="0"/>
-              <a:t> amount (% </a:t>
-            </a:r>
-            <a:r>
               <a:rPr lang="en-US" sz="1400" dirty="0"/>
-              <a:t>lab tray coverage</a:t>
-            </a:r>
-            <a:r>
-              <a:rPr lang="en-US" sz="1400" dirty="0" smtClean="0"/>
-              <a:t>) from each quadrat </a:t>
-            </a:r>
-            <a:r>
-              <a:rPr lang="en-US" sz="1400" b="1" dirty="0" smtClean="0"/>
+              <a:t> amount (% lab tray coverage) from each quadrat </a:t>
+            </a:r>
+            <a:r>
+              <a:rPr lang="en-US" sz="1400" b="1" dirty="0"/>
               <a:t>(A)</a:t>
             </a:r>
             <a:r>
-              <a:rPr lang="en-US" sz="1400" dirty="0" smtClean="0"/>
+              <a:rPr lang="en-US" sz="1400" dirty="0"/>
               <a:t> demonstrate shifts in abundance across an environmental gradient ranging from pH 8.1 to 6.7. The mean abundance (% lab tray coverage) of each species in quadrats A-C compared with quadrats G-I </a:t>
             </a:r>
             <a:r>
-              <a:rPr lang="en-US" sz="1400" b="1" dirty="0" smtClean="0"/>
+              <a:rPr lang="en-US" sz="1400" b="1" dirty="0"/>
               <a:t>(B) </a:t>
             </a:r>
             <a:r>
-              <a:rPr lang="en-US" sz="1400" dirty="0" smtClean="0"/>
+              <a:rPr lang="en-US" sz="1400" dirty="0"/>
               <a:t>show that several species of </a:t>
             </a:r>
             <a:r>
-              <a:rPr lang="en-US" sz="1400" dirty="0" err="1" smtClean="0"/>
+              <a:rPr lang="en-US" sz="1400" dirty="0" err="1"/>
               <a:t>macroalgae</a:t>
             </a:r>
             <a:r>
-              <a:rPr lang="en-US" sz="1400" dirty="0" smtClean="0"/>
+              <a:rPr lang="en-US" sz="1400" dirty="0"/>
               <a:t> are absent from the most acidic environments (e.g. </a:t>
             </a:r>
             <a:r>
-              <a:rPr lang="en-US" sz="1400" i="1" dirty="0" err="1" smtClean="0"/>
+              <a:rPr lang="en-US" sz="1400" i="1" dirty="0" err="1"/>
               <a:t>Jania</a:t>
             </a:r>
             <a:r>
-              <a:rPr lang="en-US" sz="1400" i="1" dirty="0" smtClean="0"/>
+              <a:rPr lang="en-US" sz="1400" i="1" dirty="0"/>
               <a:t> </a:t>
             </a:r>
             <a:r>
-              <a:rPr lang="en-US" sz="1400" i="1" dirty="0" err="1" smtClean="0"/>
+              <a:rPr lang="en-US" sz="1400" i="1" dirty="0" err="1"/>
               <a:t>rubens</a:t>
             </a:r>
             <a:r>
-              <a:rPr lang="en-US" sz="1400" i="1" dirty="0" smtClean="0"/>
+              <a:rPr lang="en-US" sz="1400" i="1" dirty="0"/>
               <a:t>, </a:t>
             </a:r>
             <a:r>
-              <a:rPr lang="en-US" sz="1400" i="1" dirty="0" err="1" smtClean="0"/>
+              <a:rPr lang="en-US" sz="1400" i="1" dirty="0" err="1"/>
               <a:t>Valonia</a:t>
             </a:r>
             <a:r>
-              <a:rPr lang="en-US" sz="1400" i="1" dirty="0" smtClean="0"/>
+              <a:rPr lang="en-US" sz="1400" i="1" dirty="0"/>
               <a:t> </a:t>
             </a:r>
             <a:r>
-              <a:rPr lang="en-US" sz="1400" i="1" dirty="0" err="1" smtClean="0"/>
+              <a:rPr lang="en-US" sz="1400" i="1" dirty="0" err="1"/>
               <a:t>utriclaris</a:t>
             </a:r>
             <a:r>
-              <a:rPr lang="en-US" sz="1400" i="1" dirty="0" smtClean="0"/>
+              <a:rPr lang="en-US" sz="1400" i="1" dirty="0"/>
               <a:t>, </a:t>
             </a:r>
             <a:r>
-              <a:rPr lang="en-US" sz="1400" i="1" dirty="0" err="1" smtClean="0"/>
+              <a:rPr lang="en-US" sz="1400" i="1" dirty="0" err="1"/>
               <a:t>Flabelia</a:t>
             </a:r>
             <a:r>
-              <a:rPr lang="en-US" sz="1400" i="1" dirty="0" smtClean="0"/>
+              <a:rPr lang="en-US" sz="1400" i="1" dirty="0"/>
               <a:t> petiolate</a:t>
             </a:r>
             <a:r>
-              <a:rPr lang="en-US" sz="1400" dirty="0" smtClean="0"/>
+              <a:rPr lang="en-US" sz="1400" dirty="0"/>
               <a:t>) as new species arise or increase in abundance (e.g. </a:t>
             </a:r>
             <a:r>
-              <a:rPr lang="en-US" sz="1400" i="1" dirty="0" err="1" smtClean="0"/>
+              <a:rPr lang="en-US" sz="1400" i="1" dirty="0" err="1"/>
               <a:t>Dictyota</a:t>
             </a:r>
             <a:r>
-              <a:rPr lang="en-US" sz="1400" i="1" dirty="0" smtClean="0"/>
+              <a:rPr lang="en-US" sz="1400" i="1" dirty="0"/>
               <a:t> </a:t>
             </a:r>
             <a:r>
-              <a:rPr lang="en-US" sz="1400" i="1" dirty="0" err="1" smtClean="0"/>
+              <a:rPr lang="en-US" sz="1400" i="1" dirty="0" err="1"/>
               <a:t>dichotoma</a:t>
             </a:r>
             <a:r>
-              <a:rPr lang="en-US" sz="1400" i="1" dirty="0" smtClean="0"/>
+              <a:rPr lang="en-US" sz="1400" i="1" dirty="0"/>
               <a:t>, </a:t>
             </a:r>
             <a:r>
-              <a:rPr lang="en-US" sz="1400" i="1" dirty="0" err="1" smtClean="0"/>
+              <a:rPr lang="en-US" sz="1400" i="1" dirty="0" err="1"/>
               <a:t>Sarcassum</a:t>
             </a:r>
             <a:r>
-              <a:rPr lang="en-US" sz="1400" i="1" dirty="0" smtClean="0"/>
+              <a:rPr lang="en-US" sz="1400" i="1" dirty="0"/>
               <a:t> </a:t>
             </a:r>
             <a:r>
-              <a:rPr lang="en-US" sz="1400" i="1" dirty="0" err="1" smtClean="0"/>
+              <a:rPr lang="en-US" sz="1400" i="1" dirty="0" err="1"/>
               <a:t>vulgare</a:t>
             </a:r>
             <a:r>
-              <a:rPr lang="en-US" sz="1400" i="1" dirty="0" smtClean="0"/>
+              <a:rPr lang="en-US" sz="1400" i="1" dirty="0"/>
               <a:t>, </a:t>
             </a:r>
             <a:r>
-              <a:rPr lang="en-US" sz="1400" i="1" dirty="0" err="1" smtClean="0"/>
+              <a:rPr lang="en-US" sz="1400" i="1" dirty="0" err="1"/>
               <a:t>Chondracanthus</a:t>
             </a:r>
             <a:r>
-              <a:rPr lang="en-US" sz="1400" i="1" dirty="0" smtClean="0"/>
+              <a:rPr lang="en-US" sz="1400" i="1" dirty="0"/>
               <a:t> </a:t>
             </a:r>
             <a:r>
-              <a:rPr lang="en-US" sz="1400" i="1" dirty="0" err="1" smtClean="0"/>
+              <a:rPr lang="en-US" sz="1400" i="1" dirty="0" err="1"/>
               <a:t>acicularis</a:t>
             </a:r>
             <a:r>
-              <a:rPr lang="en-US" sz="1400" dirty="0" smtClean="0"/>
-              <a:t>). [Note: This is an animation that alternates between with and without panel gridlines every 8 seconds (visible from slideshow mode). Hopefully we can determine which is better, and I enjoyed making my first gif!]</a:t>
-            </a:r>
-            <a:endParaRPr lang="en-US" sz="1400" dirty="0"/>
+              <a:rPr lang="en-US" sz="1400" dirty="0"/>
+              <a:t>). [Note: This is an animation that alternates between with and without panel gridlines every 8 seconds (visible from slideshow mode). Hopefully, you can help me determine which to commit to. I enjoyed making my first gif, albeit simple!]</a:t>
+            </a:r>
           </a:p>
         </p:txBody>
       </p:sp>
@@ -4183,13 +4229,6 @@
   <p:clrMapOvr>
     <a:masterClrMapping/>
   </p:clrMapOvr>
-  <p:timing>
-    <p:tnLst>
-      <p:par>
-        <p:cTn id="1" dur="indefinite" restart="never" nodeType="tmRoot"/>
-      </p:par>
-    </p:tnLst>
-  </p:timing>
 </p:sld>
 </file>
 
@@ -4212,7 +4251,13 @@
       </p:grpSpPr>
       <p:pic>
         <p:nvPicPr>
-          <p:cNvPr id="3" name="Picture 2"/>
+          <p:cNvPr id="5" name="Picture 4" descr="A close up of a map&#10;&#10;Description automatically generated">
+            <a:extLst>
+              <a:ext uri="{FF2B5EF4-FFF2-40B4-BE49-F238E27FC236}">
+                <a16:creationId xmlns:a16="http://schemas.microsoft.com/office/drawing/2014/main" id="{AD0F09BC-8A3F-A148-977C-1E0EA245BE3F}"/>
+              </a:ext>
+            </a:extLst>
+          </p:cNvPr>
           <p:cNvPicPr>
             <a:picLocks noChangeAspect="1"/>
           </p:cNvPicPr>
@@ -4248,8 +4293,8 @@
         </p:nvSpPr>
         <p:spPr>
           <a:xfrm>
-            <a:off x="6319520" y="1752754"/>
-            <a:ext cx="2824480" cy="5394105"/>
+            <a:off x="6070600" y="1752600"/>
+            <a:ext cx="3073400" cy="4692375"/>
           </a:xfrm>
           <a:prstGeom prst="rect">
             <a:avLst/>
@@ -4270,15 +4315,63 @@
               </a:spcAft>
             </a:pPr>
             <a:r>
-              <a:rPr lang="en-US" sz="1400" dirty="0" smtClean="0">
+              <a:rPr lang="en-US" sz="1400" dirty="0">
                 <a:latin typeface="Calibri" panose="020F0502020204030204" pitchFamily="34" charset="0"/>
                 <a:ea typeface="Calibri" panose="020F0502020204030204" pitchFamily="34" charset="0"/>
                 <a:cs typeface="Times New Roman" panose="02020603050405020304" pitchFamily="18" charset="0"/>
               </a:rPr>
-              <a:t>Figure 2. In lake ecosystems CO</a:t>
-            </a:r>
-            <a:r>
-              <a:rPr lang="en-US" sz="1400" baseline="-25000" dirty="0" smtClean="0">
+              <a:t>Figure 2. In lake ecosystems, plants and algae in three habitats - </a:t>
+            </a:r>
+            <a:r>
+              <a:rPr lang="en-US" sz="1400" b="1" dirty="0">
+                <a:latin typeface="Calibri" panose="020F0502020204030204" pitchFamily="34" charset="0"/>
+                <a:ea typeface="Calibri" panose="020F0502020204030204" pitchFamily="34" charset="0"/>
+                <a:cs typeface="Times New Roman" panose="02020603050405020304" pitchFamily="18" charset="0"/>
+              </a:rPr>
+              <a:t>littoral</a:t>
+            </a:r>
+            <a:r>
+              <a:rPr lang="en-US" sz="1400" dirty="0">
+                <a:latin typeface="Calibri" panose="020F0502020204030204" pitchFamily="34" charset="0"/>
+                <a:ea typeface="Calibri" panose="020F0502020204030204" pitchFamily="34" charset="0"/>
+                <a:cs typeface="Times New Roman" panose="02020603050405020304" pitchFamily="18" charset="0"/>
+              </a:rPr>
+              <a:t> (submerged illuminated edge), </a:t>
+            </a:r>
+            <a:r>
+              <a:rPr lang="en-US" sz="1400" b="1" dirty="0">
+                <a:latin typeface="Calibri" panose="020F0502020204030204" pitchFamily="34" charset="0"/>
+                <a:ea typeface="Calibri" panose="020F0502020204030204" pitchFamily="34" charset="0"/>
+                <a:cs typeface="Times New Roman" panose="02020603050405020304" pitchFamily="18" charset="0"/>
+              </a:rPr>
+              <a:t>pelagic</a:t>
+            </a:r>
+            <a:r>
+              <a:rPr lang="en-US" sz="1400" dirty="0">
+                <a:latin typeface="Calibri" panose="020F0502020204030204" pitchFamily="34" charset="0"/>
+                <a:ea typeface="Calibri" panose="020F0502020204030204" pitchFamily="34" charset="0"/>
+                <a:cs typeface="Times New Roman" panose="02020603050405020304" pitchFamily="18" charset="0"/>
+              </a:rPr>
+              <a:t> (open water) and </a:t>
+            </a:r>
+            <a:r>
+              <a:rPr lang="en-US" sz="1400" b="1" dirty="0">
+                <a:latin typeface="Calibri" panose="020F0502020204030204" pitchFamily="34" charset="0"/>
+                <a:ea typeface="Calibri" panose="020F0502020204030204" pitchFamily="34" charset="0"/>
+                <a:cs typeface="Times New Roman" panose="02020603050405020304" pitchFamily="18" charset="0"/>
+              </a:rPr>
+              <a:t>terrestrial</a:t>
+            </a:r>
+            <a:r>
+              <a:rPr lang="en-US" sz="1400" dirty="0">
+                <a:latin typeface="Calibri" panose="020F0502020204030204" pitchFamily="34" charset="0"/>
+                <a:ea typeface="Calibri" panose="020F0502020204030204" pitchFamily="34" charset="0"/>
+                <a:cs typeface="Times New Roman" panose="02020603050405020304" pitchFamily="18" charset="0"/>
+              </a:rPr>
+              <a:t> (land surrounding the lake) – convert CO</a:t>
+            </a:r>
+            <a:r>
+              <a:rPr lang="en-US" sz="1400" baseline="-25000" dirty="0">
                 <a:latin typeface="Calibri" panose="020F0502020204030204" pitchFamily="34" charset="0"/>
                 <a:ea typeface="Calibri" panose="020F0502020204030204" pitchFamily="34" charset="0"/>
                 <a:cs typeface="Times New Roman" panose="02020603050405020304" pitchFamily="18" charset="0"/>
@@ -4286,60 +4379,12 @@
               <a:t>2</a:t>
             </a:r>
             <a:r>
-              <a:rPr lang="en-US" sz="1400" dirty="0" smtClean="0">
-                <a:latin typeface="Calibri" panose="020F0502020204030204" pitchFamily="34" charset="0"/>
-                <a:ea typeface="Calibri" panose="020F0502020204030204" pitchFamily="34" charset="0"/>
-                <a:cs typeface="Times New Roman" panose="02020603050405020304" pitchFamily="18" charset="0"/>
-              </a:rPr>
-              <a:t> is made biologically available to the rest of the food web by plants in three main habitats, littoral (submerged illuminated edge), pelagic (open water) and terrestrial (land surrounding the lake). It turns out there is natural and consistent variation among these groups in how many molecules have extra neutrons</a:t>
-            </a:r>
-            <a:r>
-              <a:rPr lang="en-US" sz="1400" smtClean="0">
-                <a:latin typeface="Calibri" panose="020F0502020204030204" pitchFamily="34" charset="0"/>
-                <a:ea typeface="Calibri" panose="020F0502020204030204" pitchFamily="34" charset="0"/>
-                <a:cs typeface="Times New Roman" panose="02020603050405020304" pitchFamily="18" charset="0"/>
-              </a:rPr>
-              <a:t>! Data </a:t>
-            </a:r>
-            <a:r>
               <a:rPr lang="en-US" sz="1400" dirty="0">
                 <a:latin typeface="Calibri" panose="020F0502020204030204" pitchFamily="34" charset="0"/>
                 <a:ea typeface="Calibri" panose="020F0502020204030204" pitchFamily="34" charset="0"/>
                 <a:cs typeface="Times New Roman" panose="02020603050405020304" pitchFamily="18" charset="0"/>
               </a:rPr>
-              <a:t>used in mixing models for each lake show the mean (± SD) of the carbon and nitrogen stable isotope ratios for terrestrial, pelagic, and littoral basal resources. The points show the stable isotope ratios of fish prior to (brown) and after (black) adjusting with trophic enrichment values from Bunn 2013</a:t>
-            </a:r>
-            <a:r>
-              <a:rPr lang="en-US" sz="1400" dirty="0" smtClean="0">
-                <a:latin typeface="Calibri" panose="020F0502020204030204" pitchFamily="34" charset="0"/>
-                <a:ea typeface="Calibri" panose="020F0502020204030204" pitchFamily="34" charset="0"/>
-                <a:cs typeface="Times New Roman" panose="02020603050405020304" pitchFamily="18" charset="0"/>
-              </a:rPr>
-              <a:t>. </a:t>
-            </a:r>
-            <a:r>
-              <a:rPr lang="en-US" sz="1400" dirty="0">
-                <a:latin typeface="Calibri" panose="020F0502020204030204" pitchFamily="34" charset="0"/>
-                <a:ea typeface="Calibri" panose="020F0502020204030204" pitchFamily="34" charset="0"/>
-                <a:cs typeface="Times New Roman" panose="02020603050405020304" pitchFamily="18" charset="0"/>
-              </a:rPr>
-              <a:t>An isotope </a:t>
-            </a:r>
-            <a:r>
-              <a:rPr lang="en-US" sz="1400" dirty="0" err="1">
-                <a:latin typeface="Calibri" panose="020F0502020204030204" pitchFamily="34" charset="0"/>
-                <a:ea typeface="Calibri" panose="020F0502020204030204" pitchFamily="34" charset="0"/>
-                <a:cs typeface="Times New Roman" panose="02020603050405020304" pitchFamily="18" charset="0"/>
-              </a:rPr>
-              <a:t>biplot</a:t>
-            </a:r>
-            <a:r>
-              <a:rPr lang="en-US" sz="1400" dirty="0">
-                <a:latin typeface="Calibri" panose="020F0502020204030204" pitchFamily="34" charset="0"/>
-                <a:ea typeface="Calibri" panose="020F0502020204030204" pitchFamily="34" charset="0"/>
-                <a:cs typeface="Times New Roman" panose="02020603050405020304" pitchFamily="18" charset="0"/>
-              </a:rPr>
-              <a:t> for each lake is expected, even if this plot ends up in the supplementary materials of a publication. </a:t>
+              <a:t> into forms of carbon that are usable to the rest of the food web through photosynthesis. Natural differences in the frequency that atoms contain extra neutrons occurs among these three habitats (greater values reflect higher occurrences of atoms with an extra neutron). Estimates of the importance of each habitat to each fish are obtained by comparing the values in the fish tissue to the values observed in plant tissue from each habitat. The shading gives a sense of uncertainty around source values, lighter gray is more unlikely. </a:t>
             </a:r>
           </a:p>
         </p:txBody>
@@ -4354,13 +4399,6 @@
   <p:clrMapOvr>
     <a:masterClrMapping/>
   </p:clrMapOvr>
-  <p:timing>
-    <p:tnLst>
-      <p:par>
-        <p:cTn id="1" dur="indefinite" restart="never" nodeType="tmRoot"/>
-      </p:par>
-    </p:tnLst>
-  </p:timing>
 </p:sld>
 </file>
 
@@ -4381,22 +4419,22 @@
         <a:srgbClr val="E7E6E6"/>
       </a:lt2>
       <a:accent1>
-        <a:srgbClr val="5B9BD5"/>
+        <a:srgbClr val="1D9A78"/>
       </a:accent1>
       <a:accent2>
-        <a:srgbClr val="ED7D31"/>
+        <a:srgbClr val="8BC145"/>
       </a:accent2>
       <a:accent3>
-        <a:srgbClr val="A5A5A5"/>
+        <a:srgbClr val="36AFCE"/>
       </a:accent3>
       <a:accent4>
-        <a:srgbClr val="FFC000"/>
+        <a:srgbClr val="1D6FA9"/>
       </a:accent4>
       <a:accent5>
-        <a:srgbClr val="4472C4"/>
+        <a:srgbClr val="B74919"/>
       </a:accent5>
       <a:accent6>
-        <a:srgbClr val="70AD47"/>
+        <a:srgbClr val="F19D19"/>
       </a:accent6>
       <a:hlink>
         <a:srgbClr val="0563C1"/>
@@ -4619,7 +4657,7 @@
   <a:extraClrSchemeLst/>
   <a:extLst>
     <a:ext uri="{05A4C25C-085E-4340-85A3-A5531E510DB2}">
-      <thm15:themeFamily xmlns:thm15="http://schemas.microsoft.com/office/thememl/2012/main" name="Office Theme" id="{62F939B6-93AF-4DB8-9C6B-D6C7DFDC589F}" vid="{4A3C46E8-61CC-4603-A589-7422A47A8E4A}"/>
+      <thm15:themeFamily xmlns:thm15="http://schemas.microsoft.com/office/thememl/2012/main" name="Office Theme" id="{62F939B6-93AF-4DB8-9C6B-D6C7DFDC589F}" vid="{AE6F2518-B084-4896-AF52-66CC2144AA26}"/>
     </a:ext>
   </a:extLst>
 </a:theme>

</xml_diff>